<commit_message>
Mic Self-Noise: adding mic summary XLS and figure
</commit_message>
<xml_diff>
--- a/2018-08-22 Microphone Self-Noise/Figures/figures.pptx
+++ b/2018-08-22 Microphone Self-Noise/Figures/figures.pptx
@@ -7,6 +7,7 @@
   <p:sldIdLst>
     <p:sldId id="256" r:id="rId2"/>
     <p:sldId id="257" r:id="rId3"/>
+    <p:sldId id="258" r:id="rId4"/>
   </p:sldIdLst>
   <p:sldSz cx="9144000" cy="6858000" type="screen4x3"/>
   <p:notesSz cx="6858000" cy="9144000"/>
@@ -290,7 +291,7 @@
             <a:fld id="{1D8BD707-D9CF-40AE-B4C6-C98DA3205C09}" type="datetimeFigureOut">
               <a:rPr lang="en-US" smtClean="0"/>
               <a:pPr/>
-              <a:t>8/20/2018</a:t>
+              <a:t>8/23/2018</a:t>
             </a:fld>
             <a:endParaRPr lang="en-US"/>
           </a:p>
@@ -457,7 +458,7 @@
             <a:fld id="{1D8BD707-D9CF-40AE-B4C6-C98DA3205C09}" type="datetimeFigureOut">
               <a:rPr lang="en-US" smtClean="0"/>
               <a:pPr/>
-              <a:t>8/20/2018</a:t>
+              <a:t>8/23/2018</a:t>
             </a:fld>
             <a:endParaRPr lang="en-US"/>
           </a:p>
@@ -634,7 +635,7 @@
             <a:fld id="{1D8BD707-D9CF-40AE-B4C6-C98DA3205C09}" type="datetimeFigureOut">
               <a:rPr lang="en-US" smtClean="0"/>
               <a:pPr/>
-              <a:t>8/20/2018</a:t>
+              <a:t>8/23/2018</a:t>
             </a:fld>
             <a:endParaRPr lang="en-US"/>
           </a:p>
@@ -801,7 +802,7 @@
             <a:fld id="{1D8BD707-D9CF-40AE-B4C6-C98DA3205C09}" type="datetimeFigureOut">
               <a:rPr lang="en-US" smtClean="0"/>
               <a:pPr/>
-              <a:t>8/20/2018</a:t>
+              <a:t>8/23/2018</a:t>
             </a:fld>
             <a:endParaRPr lang="en-US"/>
           </a:p>
@@ -1044,7 +1045,7 @@
             <a:fld id="{1D8BD707-D9CF-40AE-B4C6-C98DA3205C09}" type="datetimeFigureOut">
               <a:rPr lang="en-US" smtClean="0"/>
               <a:pPr/>
-              <a:t>8/20/2018</a:t>
+              <a:t>8/23/2018</a:t>
             </a:fld>
             <a:endParaRPr lang="en-US"/>
           </a:p>
@@ -1329,7 +1330,7 @@
             <a:fld id="{1D8BD707-D9CF-40AE-B4C6-C98DA3205C09}" type="datetimeFigureOut">
               <a:rPr lang="en-US" smtClean="0"/>
               <a:pPr/>
-              <a:t>8/20/2018</a:t>
+              <a:t>8/23/2018</a:t>
             </a:fld>
             <a:endParaRPr lang="en-US"/>
           </a:p>
@@ -1748,7 +1749,7 @@
             <a:fld id="{1D8BD707-D9CF-40AE-B4C6-C98DA3205C09}" type="datetimeFigureOut">
               <a:rPr lang="en-US" smtClean="0"/>
               <a:pPr/>
-              <a:t>8/20/2018</a:t>
+              <a:t>8/23/2018</a:t>
             </a:fld>
             <a:endParaRPr lang="en-US"/>
           </a:p>
@@ -1863,7 +1864,7 @@
             <a:fld id="{1D8BD707-D9CF-40AE-B4C6-C98DA3205C09}" type="datetimeFigureOut">
               <a:rPr lang="en-US" smtClean="0"/>
               <a:pPr/>
-              <a:t>8/20/2018</a:t>
+              <a:t>8/23/2018</a:t>
             </a:fld>
             <a:endParaRPr lang="en-US"/>
           </a:p>
@@ -1955,7 +1956,7 @@
             <a:fld id="{1D8BD707-D9CF-40AE-B4C6-C98DA3205C09}" type="datetimeFigureOut">
               <a:rPr lang="en-US" smtClean="0"/>
               <a:pPr/>
-              <a:t>8/20/2018</a:t>
+              <a:t>8/23/2018</a:t>
             </a:fld>
             <a:endParaRPr lang="en-US"/>
           </a:p>
@@ -2229,7 +2230,7 @@
             <a:fld id="{1D8BD707-D9CF-40AE-B4C6-C98DA3205C09}" type="datetimeFigureOut">
               <a:rPr lang="en-US" smtClean="0"/>
               <a:pPr/>
-              <a:t>8/20/2018</a:t>
+              <a:t>8/23/2018</a:t>
             </a:fld>
             <a:endParaRPr lang="en-US"/>
           </a:p>
@@ -2479,7 +2480,7 @@
             <a:fld id="{1D8BD707-D9CF-40AE-B4C6-C98DA3205C09}" type="datetimeFigureOut">
               <a:rPr lang="en-US" smtClean="0"/>
               <a:pPr/>
-              <a:t>8/20/2018</a:t>
+              <a:t>8/23/2018</a:t>
             </a:fld>
             <a:endParaRPr lang="en-US"/>
           </a:p>
@@ -2689,7 +2690,7 @@
             <a:fld id="{1D8BD707-D9CF-40AE-B4C6-C98DA3205C09}" type="datetimeFigureOut">
               <a:rPr lang="en-US" smtClean="0"/>
               <a:pPr/>
-              <a:t>8/20/2018</a:t>
+              <a:t>8/23/2018</a:t>
             </a:fld>
             <a:endParaRPr lang="en-US"/>
           </a:p>
@@ -4175,6 +4176,161 @@
 </p:sld>
 </file>
 
+<file path=ppt/slides/slide3.xml><?xml version="1.0" encoding="utf-8"?>
+<p:sld xmlns:a="http://schemas.openxmlformats.org/drawingml/2006/main" xmlns:r="http://schemas.openxmlformats.org/officeDocument/2006/relationships" xmlns:p="http://schemas.openxmlformats.org/presentationml/2006/main">
+  <p:cSld>
+    <p:spTree>
+      <p:nvGrpSpPr>
+        <p:cNvPr id="1" name=""/>
+        <p:cNvGrpSpPr/>
+        <p:nvPr/>
+      </p:nvGrpSpPr>
+      <p:grpSpPr>
+        <a:xfrm>
+          <a:off x="0" y="0"/>
+          <a:ext cx="0" cy="0"/>
+          <a:chOff x="0" y="0"/>
+          <a:chExt cx="0" cy="0"/>
+        </a:xfrm>
+      </p:grpSpPr>
+      <p:grpSp>
+        <p:nvGrpSpPr>
+          <p:cNvPr id="5" name="Group 4"/>
+          <p:cNvGrpSpPr/>
+          <p:nvPr/>
+        </p:nvGrpSpPr>
+        <p:grpSpPr>
+          <a:xfrm>
+            <a:off x="4825572" y="4518212"/>
+            <a:ext cx="3708828" cy="2187388"/>
+            <a:chOff x="4825572" y="4518212"/>
+            <a:chExt cx="3708828" cy="2187388"/>
+          </a:xfrm>
+        </p:grpSpPr>
+        <p:sp>
+          <p:nvSpPr>
+            <p:cNvPr id="3" name="Rectangle 2"/>
+            <p:cNvSpPr/>
+            <p:nvPr/>
+          </p:nvSpPr>
+          <p:spPr>
+            <a:xfrm>
+              <a:off x="4825572" y="4518212"/>
+              <a:ext cx="3708828" cy="2187388"/>
+            </a:xfrm>
+            <a:prstGeom prst="rect">
+              <a:avLst/>
+            </a:prstGeom>
+            <a:solidFill>
+              <a:schemeClr val="bg1"/>
+            </a:solidFill>
+            <a:ln>
+              <a:solidFill>
+                <a:schemeClr val="bg1"/>
+              </a:solidFill>
+            </a:ln>
+          </p:spPr>
+          <p:style>
+            <a:lnRef idx="2">
+              <a:schemeClr val="accent1">
+                <a:shade val="50000"/>
+              </a:schemeClr>
+            </a:lnRef>
+            <a:fillRef idx="1">
+              <a:schemeClr val="accent1"/>
+            </a:fillRef>
+            <a:effectRef idx="0">
+              <a:schemeClr val="accent1"/>
+            </a:effectRef>
+            <a:fontRef idx="minor">
+              <a:schemeClr val="lt1"/>
+            </a:fontRef>
+          </p:style>
+          <p:txBody>
+            <a:bodyPr rtlCol="0" anchor="ctr"/>
+            <a:lstStyle/>
+            <a:p>
+              <a:pPr algn="ctr"/>
+              <a:endParaRPr lang="en-US"/>
+            </a:p>
+          </p:txBody>
+        </p:sp>
+        <p:pic>
+          <p:nvPicPr>
+            <p:cNvPr id="4" name="Picture 4"/>
+            <p:cNvPicPr>
+              <a:picLocks noChangeAspect="1" noChangeArrowheads="1"/>
+            </p:cNvPicPr>
+            <p:nvPr/>
+          </p:nvPicPr>
+          <p:blipFill rotWithShape="1">
+            <a:blip r:embed="rId2">
+              <a:extLst>
+                <a:ext uri="{28A0092B-C50C-407E-A947-70E740481C1C}">
+                  <a14:useLocalDpi xmlns:a14="http://schemas.microsoft.com/office/drawing/2010/main" val="0"/>
+                </a:ext>
+              </a:extLst>
+            </a:blip>
+            <a:srcRect l="8463" t="64373" r="51891" b="4440"/>
+            <a:stretch/>
+          </p:blipFill>
+          <p:spPr bwMode="auto">
+            <a:xfrm>
+              <a:off x="4825572" y="4518212"/>
+              <a:ext cx="3708827" cy="2187388"/>
+            </a:xfrm>
+            <a:prstGeom prst="rect">
+              <a:avLst/>
+            </a:prstGeom>
+            <a:noFill/>
+            <a:ln>
+              <a:noFill/>
+            </a:ln>
+            <a:effectLst/>
+            <a:extLst>
+              <a:ext uri="{909E8E84-426E-40DD-AFC4-6F175D3DCCD1}">
+                <a14:hiddenFill xmlns:a14="http://schemas.microsoft.com/office/drawing/2010/main">
+                  <a:solidFill>
+                    <a:schemeClr val="accent1"/>
+                  </a:solidFill>
+                </a14:hiddenFill>
+              </a:ext>
+              <a:ext uri="{91240B29-F687-4F45-9708-019B960494DF}">
+                <a14:hiddenLine xmlns:a14="http://schemas.microsoft.com/office/drawing/2010/main" w="9525">
+                  <a:solidFill>
+                    <a:schemeClr val="tx1"/>
+                  </a:solidFill>
+                  <a:miter lim="800000"/>
+                  <a:headEnd/>
+                  <a:tailEnd/>
+                </a14:hiddenLine>
+              </a:ext>
+              <a:ext uri="{AF507438-7753-43E0-B8FC-AC1667EBCBE1}">
+                <a14:hiddenEffects xmlns:a14="http://schemas.microsoft.com/office/drawing/2010/main">
+                  <a:effectLst>
+                    <a:outerShdw dist="35921" dir="2700000" algn="ctr" rotWithShape="0">
+                      <a:schemeClr val="bg2"/>
+                    </a:outerShdw>
+                  </a:effectLst>
+                </a14:hiddenEffects>
+              </a:ext>
+            </a:extLst>
+          </p:spPr>
+        </p:pic>
+      </p:grpSp>
+    </p:spTree>
+    <p:extLst>
+      <p:ext uri="{BB962C8B-B14F-4D97-AF65-F5344CB8AC3E}">
+        <p14:creationId xmlns:p14="http://schemas.microsoft.com/office/powerpoint/2010/main" val="3185395147"/>
+      </p:ext>
+    </p:extLst>
+  </p:cSld>
+  <p:clrMapOvr>
+    <a:masterClrMapping/>
+  </p:clrMapOvr>
+</p:sld>
+</file>
+
 <file path=ppt/theme/theme1.xml><?xml version="1.0" encoding="utf-8"?>
 <a:theme xmlns:a="http://schemas.openxmlformats.org/drawingml/2006/main" name="Office Theme">
   <a:themeElements>

</xml_diff>